<commit_message>
add papers and R tutorial
</commit_message>
<xml_diff>
--- a/Advances in quantitative genetics.pptx
+++ b/Advances in quantitative genetics.pptx
@@ -18847,6 +18847,168 @@
           </a:p>
         </p:txBody>
       </p:sp>
+      <p:sp>
+        <p:nvSpPr>
+          <p:cNvPr id="6" name="Rectangle 5">
+            <a:extLst>
+              <a:ext uri="{FF2B5EF4-FFF2-40B4-BE49-F238E27FC236}">
+                <a16:creationId xmlns:a16="http://schemas.microsoft.com/office/drawing/2014/main" id="{D2324B9F-34FA-4859-9132-5F4F136F807A}"/>
+              </a:ext>
+            </a:extLst>
+          </p:cNvPr>
+          <p:cNvSpPr/>
+          <p:nvPr/>
+        </p:nvSpPr>
+        <p:spPr>
+          <a:xfrm>
+            <a:off x="180975" y="4285821"/>
+            <a:ext cx="12011025" cy="2490451"/>
+          </a:xfrm>
+          <a:prstGeom prst="rect">
+            <a:avLst/>
+          </a:prstGeom>
+          <a:solidFill>
+            <a:schemeClr val="bg1">
+              <a:alpha val="81000"/>
+            </a:schemeClr>
+          </a:solidFill>
+          <a:ln>
+            <a:noFill/>
+          </a:ln>
+        </p:spPr>
+        <p:style>
+          <a:lnRef idx="2">
+            <a:schemeClr val="accent1">
+              <a:shade val="50000"/>
+            </a:schemeClr>
+          </a:lnRef>
+          <a:fillRef idx="1">
+            <a:schemeClr val="accent1"/>
+          </a:fillRef>
+          <a:effectRef idx="0">
+            <a:schemeClr val="accent1"/>
+          </a:effectRef>
+          <a:fontRef idx="minor">
+            <a:schemeClr val="lt1"/>
+          </a:fontRef>
+        </p:style>
+        <p:txBody>
+          <a:bodyPr rtlCol="0" anchor="ctr"/>
+          <a:lstStyle/>
+          <a:p>
+            <a:pPr algn="ctr"/>
+            <a:endParaRPr lang="en-GB"/>
+          </a:p>
+        </p:txBody>
+      </p:sp>
+      <p:sp>
+        <p:nvSpPr>
+          <p:cNvPr id="7" name="Rectangle 6">
+            <a:extLst>
+              <a:ext uri="{FF2B5EF4-FFF2-40B4-BE49-F238E27FC236}">
+                <a16:creationId xmlns:a16="http://schemas.microsoft.com/office/drawing/2014/main" id="{EDC3258F-4BC3-4944-BF98-9625BE79D884}"/>
+              </a:ext>
+            </a:extLst>
+          </p:cNvPr>
+          <p:cNvSpPr/>
+          <p:nvPr/>
+        </p:nvSpPr>
+        <p:spPr>
+          <a:xfrm>
+            <a:off x="90487" y="3319634"/>
+            <a:ext cx="12011025" cy="3004529"/>
+          </a:xfrm>
+          <a:prstGeom prst="rect">
+            <a:avLst/>
+          </a:prstGeom>
+          <a:solidFill>
+            <a:schemeClr val="bg1">
+              <a:alpha val="81000"/>
+            </a:schemeClr>
+          </a:solidFill>
+          <a:ln>
+            <a:noFill/>
+          </a:ln>
+        </p:spPr>
+        <p:style>
+          <a:lnRef idx="2">
+            <a:schemeClr val="accent1">
+              <a:shade val="50000"/>
+            </a:schemeClr>
+          </a:lnRef>
+          <a:fillRef idx="1">
+            <a:schemeClr val="accent1"/>
+          </a:fillRef>
+          <a:effectRef idx="0">
+            <a:schemeClr val="accent1"/>
+          </a:effectRef>
+          <a:fontRef idx="minor">
+            <a:schemeClr val="lt1"/>
+          </a:fontRef>
+        </p:style>
+        <p:txBody>
+          <a:bodyPr rtlCol="0" anchor="ctr"/>
+          <a:lstStyle/>
+          <a:p>
+            <a:pPr algn="ctr"/>
+            <a:endParaRPr lang="en-GB"/>
+          </a:p>
+        </p:txBody>
+      </p:sp>
+      <p:sp>
+        <p:nvSpPr>
+          <p:cNvPr id="8" name="Rectangle 7">
+            <a:extLst>
+              <a:ext uri="{FF2B5EF4-FFF2-40B4-BE49-F238E27FC236}">
+                <a16:creationId xmlns:a16="http://schemas.microsoft.com/office/drawing/2014/main" id="{562AB487-68C1-4BDA-B35C-2E34A1B200CF}"/>
+              </a:ext>
+            </a:extLst>
+          </p:cNvPr>
+          <p:cNvSpPr/>
+          <p:nvPr/>
+        </p:nvSpPr>
+        <p:spPr>
+          <a:xfrm>
+            <a:off x="0" y="2689972"/>
+            <a:ext cx="12011025" cy="3004529"/>
+          </a:xfrm>
+          <a:prstGeom prst="rect">
+            <a:avLst/>
+          </a:prstGeom>
+          <a:solidFill>
+            <a:schemeClr val="bg1">
+              <a:alpha val="81000"/>
+            </a:schemeClr>
+          </a:solidFill>
+          <a:ln>
+            <a:noFill/>
+          </a:ln>
+        </p:spPr>
+        <p:style>
+          <a:lnRef idx="2">
+            <a:schemeClr val="accent1">
+              <a:shade val="50000"/>
+            </a:schemeClr>
+          </a:lnRef>
+          <a:fillRef idx="1">
+            <a:schemeClr val="accent1"/>
+          </a:fillRef>
+          <a:effectRef idx="0">
+            <a:schemeClr val="accent1"/>
+          </a:effectRef>
+          <a:fontRef idx="minor">
+            <a:schemeClr val="lt1"/>
+          </a:fontRef>
+        </p:style>
+        <p:txBody>
+          <a:bodyPr rtlCol="0" anchor="ctr"/>
+          <a:lstStyle/>
+          <a:p>
+            <a:pPr algn="ctr"/>
+            <a:endParaRPr lang="en-GB"/>
+          </a:p>
+        </p:txBody>
+      </p:sp>
     </p:spTree>
     <p:extLst>
       <p:ext uri="{BB962C8B-B14F-4D97-AF65-F5344CB8AC3E}">
@@ -18857,6 +19019,200 @@
   <p:clrMapOvr>
     <a:masterClrMapping/>
   </p:clrMapOvr>
+  <p:timing>
+    <p:tnLst>
+      <p:par>
+        <p:cTn id="1" dur="indefinite" restart="never" nodeType="tmRoot">
+          <p:childTnLst>
+            <p:seq concurrent="1" nextAc="seek">
+              <p:cTn id="2" dur="indefinite" nodeType="mainSeq">
+                <p:childTnLst>
+                  <p:par>
+                    <p:cTn id="3" fill="hold">
+                      <p:stCondLst>
+                        <p:cond delay="indefinite"/>
+                      </p:stCondLst>
+                      <p:childTnLst>
+                        <p:par>
+                          <p:cTn id="4" fill="hold">
+                            <p:stCondLst>
+                              <p:cond delay="0"/>
+                            </p:stCondLst>
+                            <p:childTnLst>
+                              <p:par>
+                                <p:cTn id="5" presetID="22" presetClass="exit" presetSubtype="1" fill="hold" grpId="0" nodeType="clickEffect">
+                                  <p:stCondLst>
+                                    <p:cond delay="0"/>
+                                  </p:stCondLst>
+                                  <p:childTnLst>
+                                    <p:animEffect transition="out" filter="wipe(up)">
+                                      <p:cBhvr>
+                                        <p:cTn id="6" dur="500"/>
+                                        <p:tgtEl>
+                                          <p:spTgt spid="8"/>
+                                        </p:tgtEl>
+                                      </p:cBhvr>
+                                    </p:animEffect>
+                                    <p:set>
+                                      <p:cBhvr>
+                                        <p:cTn id="7" dur="1" fill="hold">
+                                          <p:stCondLst>
+                                            <p:cond delay="499"/>
+                                          </p:stCondLst>
+                                        </p:cTn>
+                                        <p:tgtEl>
+                                          <p:spTgt spid="8"/>
+                                        </p:tgtEl>
+                                        <p:attrNameLst>
+                                          <p:attrName>style.visibility</p:attrName>
+                                        </p:attrNameLst>
+                                      </p:cBhvr>
+                                      <p:to>
+                                        <p:strVal val="hidden"/>
+                                      </p:to>
+                                    </p:set>
+                                  </p:childTnLst>
+                                </p:cTn>
+                              </p:par>
+                            </p:childTnLst>
+                          </p:cTn>
+                        </p:par>
+                      </p:childTnLst>
+                    </p:cTn>
+                  </p:par>
+                  <p:par>
+                    <p:cTn id="8" fill="hold">
+                      <p:stCondLst>
+                        <p:cond delay="indefinite"/>
+                      </p:stCondLst>
+                      <p:childTnLst>
+                        <p:par>
+                          <p:cTn id="9" fill="hold">
+                            <p:stCondLst>
+                              <p:cond delay="0"/>
+                            </p:stCondLst>
+                            <p:childTnLst>
+                              <p:par>
+                                <p:cTn id="10" presetID="22" presetClass="exit" presetSubtype="1" fill="hold" grpId="0" nodeType="clickEffect">
+                                  <p:stCondLst>
+                                    <p:cond delay="0"/>
+                                  </p:stCondLst>
+                                  <p:childTnLst>
+                                    <p:animEffect transition="out" filter="wipe(up)">
+                                      <p:cBhvr>
+                                        <p:cTn id="11" dur="500"/>
+                                        <p:tgtEl>
+                                          <p:spTgt spid="7"/>
+                                        </p:tgtEl>
+                                      </p:cBhvr>
+                                    </p:animEffect>
+                                    <p:set>
+                                      <p:cBhvr>
+                                        <p:cTn id="12" dur="1" fill="hold">
+                                          <p:stCondLst>
+                                            <p:cond delay="499"/>
+                                          </p:stCondLst>
+                                        </p:cTn>
+                                        <p:tgtEl>
+                                          <p:spTgt spid="7"/>
+                                        </p:tgtEl>
+                                        <p:attrNameLst>
+                                          <p:attrName>style.visibility</p:attrName>
+                                        </p:attrNameLst>
+                                      </p:cBhvr>
+                                      <p:to>
+                                        <p:strVal val="hidden"/>
+                                      </p:to>
+                                    </p:set>
+                                  </p:childTnLst>
+                                </p:cTn>
+                              </p:par>
+                            </p:childTnLst>
+                          </p:cTn>
+                        </p:par>
+                      </p:childTnLst>
+                    </p:cTn>
+                  </p:par>
+                  <p:par>
+                    <p:cTn id="13" fill="hold">
+                      <p:stCondLst>
+                        <p:cond delay="indefinite"/>
+                      </p:stCondLst>
+                      <p:childTnLst>
+                        <p:par>
+                          <p:cTn id="14" fill="hold">
+                            <p:stCondLst>
+                              <p:cond delay="0"/>
+                            </p:stCondLst>
+                            <p:childTnLst>
+                              <p:par>
+                                <p:cTn id="15" presetID="22" presetClass="exit" presetSubtype="1" fill="hold" grpId="0" nodeType="clickEffect">
+                                  <p:stCondLst>
+                                    <p:cond delay="0"/>
+                                  </p:stCondLst>
+                                  <p:childTnLst>
+                                    <p:animEffect transition="out" filter="wipe(up)">
+                                      <p:cBhvr>
+                                        <p:cTn id="16" dur="500"/>
+                                        <p:tgtEl>
+                                          <p:spTgt spid="6"/>
+                                        </p:tgtEl>
+                                      </p:cBhvr>
+                                    </p:animEffect>
+                                    <p:set>
+                                      <p:cBhvr>
+                                        <p:cTn id="17" dur="1" fill="hold">
+                                          <p:stCondLst>
+                                            <p:cond delay="499"/>
+                                          </p:stCondLst>
+                                        </p:cTn>
+                                        <p:tgtEl>
+                                          <p:spTgt spid="6"/>
+                                        </p:tgtEl>
+                                        <p:attrNameLst>
+                                          <p:attrName>style.visibility</p:attrName>
+                                        </p:attrNameLst>
+                                      </p:cBhvr>
+                                      <p:to>
+                                        <p:strVal val="hidden"/>
+                                      </p:to>
+                                    </p:set>
+                                  </p:childTnLst>
+                                </p:cTn>
+                              </p:par>
+                            </p:childTnLst>
+                          </p:cTn>
+                        </p:par>
+                      </p:childTnLst>
+                    </p:cTn>
+                  </p:par>
+                </p:childTnLst>
+              </p:cTn>
+              <p:prevCondLst>
+                <p:cond evt="onPrev" delay="0">
+                  <p:tgtEl>
+                    <p:sldTgt/>
+                  </p:tgtEl>
+                </p:cond>
+              </p:prevCondLst>
+              <p:nextCondLst>
+                <p:cond evt="onNext" delay="0">
+                  <p:tgtEl>
+                    <p:sldTgt/>
+                  </p:tgtEl>
+                </p:cond>
+              </p:nextCondLst>
+            </p:seq>
+          </p:childTnLst>
+        </p:cTn>
+      </p:par>
+    </p:tnLst>
+    <p:bldLst>
+      <p:bldP spid="6" grpId="0" animBg="1"/>
+      <p:bldP spid="7" grpId="0" animBg="1"/>
+      <p:bldP spid="8" grpId="0" animBg="1"/>
+    </p:bldLst>
+  </p:timing>
 </p:sld>
 </file>
 
@@ -21703,8 +22059,8 @@
           </a:p>
         </p:txBody>
       </p:sp>
-      <mc:AlternateContent xmlns:mc="http://schemas.openxmlformats.org/markup-compatibility/2006">
-        <mc:Choice xmlns:a14="http://schemas.microsoft.com/office/drawing/2010/main" Requires="a14">
+      <mc:AlternateContent xmlns:mc="http://schemas.openxmlformats.org/markup-compatibility/2006" xmlns:a14="http://schemas.microsoft.com/office/drawing/2010/main">
+        <mc:Choice Requires="a14">
           <p:sp>
             <p:nvSpPr>
               <p:cNvPr id="57" name="TextBox 56">
@@ -21912,7 +22268,7 @@
             </p:txBody>
           </p:sp>
         </mc:Choice>
-        <mc:Fallback>
+        <mc:Fallback xmlns="">
           <p:sp>
             <p:nvSpPr>
               <p:cNvPr id="57" name="TextBox 56">

</xml_diff>